<commit_message>
Adicionada tarefas para professores
Modificação do PPT e adicionei um doc com as informações.
</commit_message>
<xml_diff>
--- a/Aula 08/G10 - Apresentacao - Lab08.pptx
+++ b/Aula 08/G10 - Apresentacao - Lab08.pptx
@@ -119,7 +119,7 @@
   </p:defaultTextStyle>
   <p:extLst>
     <p:ext uri="{EFAFB233-063F-42B5-8137-9DF3F51BA10A}">
-      <p15:sldGuideLst xmlns:p15="http://schemas.microsoft.com/office/powerpoint/2012/main" xmlns="">
+      <p15:sldGuideLst xmlns="" xmlns:p15="http://schemas.microsoft.com/office/powerpoint/2012/main">
         <p15:guide id="1" orient="horz" pos="2160">
           <p15:clr>
             <a:srgbClr val="A4A3A4"/>
@@ -218,7 +218,7 @@
           <a:p>
             <a:fld id="{A0410F9C-3A27-C84F-B27D-9342140F08DB}" type="datetimeFigureOut">
               <a:rPr lang="pt-PT" smtClean="0"/>
-              <a:t>19-11-2015</a:t>
+              <a:t>19/11/2015</a:t>
             </a:fld>
             <a:endParaRPr lang="pt-PT"/>
           </a:p>
@@ -377,7 +377,7 @@
           <a:p>
             <a:fld id="{9886E254-ACB4-B240-BB93-3D6DFACA42BA}" type="slidenum">
               <a:rPr lang="pt-PT" smtClean="0"/>
-              <a:t>‹#›</a:t>
+              <a:t>‹nº›</a:t>
             </a:fld>
             <a:endParaRPr lang="pt-PT"/>
           </a:p>
@@ -687,7 +687,7 @@
           <a:p>
             <a:fld id="{D728701E-CAF4-4159-9B3E-41C86DFFA30D}" type="datetimeFigureOut">
               <a:rPr lang="en-US" smtClean="0"/>
-              <a:t>19-Nov-15</a:t>
+              <a:t>11/19/2015</a:t>
             </a:fld>
             <a:endParaRPr lang="en-US"/>
           </a:p>
@@ -1141,7 +1141,7 @@
           <a:p>
             <a:fld id="{D728701E-CAF4-4159-9B3E-41C86DFFA30D}" type="datetimeFigureOut">
               <a:rPr lang="en-US" smtClean="0"/>
-              <a:t>19-Nov-15</a:t>
+              <a:t>11/19/2015</a:t>
             </a:fld>
             <a:endParaRPr lang="en-US"/>
           </a:p>
@@ -1183,7 +1183,7 @@
           <a:p>
             <a:fld id="{162F1D00-BD13-4404-86B0-79703945A0A7}" type="slidenum">
               <a:rPr lang="en-US" smtClean="0"/>
-              <a:t>‹#›</a:t>
+              <a:t>‹nº›</a:t>
             </a:fld>
             <a:endParaRPr lang="en-US"/>
           </a:p>
@@ -1684,7 +1684,7 @@
           <a:p>
             <a:fld id="{D728701E-CAF4-4159-9B3E-41C86DFFA30D}" type="datetimeFigureOut">
               <a:rPr lang="en-US" smtClean="0"/>
-              <a:t>19-Nov-15</a:t>
+              <a:t>11/19/2015</a:t>
             </a:fld>
             <a:endParaRPr lang="en-US"/>
           </a:p>
@@ -1726,7 +1726,7 @@
           <a:p>
             <a:fld id="{162F1D00-BD13-4404-86B0-79703945A0A7}" type="slidenum">
               <a:rPr lang="en-US" smtClean="0"/>
-              <a:t>‹#›</a:t>
+              <a:t>‹nº›</a:t>
             </a:fld>
             <a:endParaRPr lang="en-US"/>
           </a:p>
@@ -1820,7 +1820,7 @@
           <a:p>
             <a:fld id="{D728701E-CAF4-4159-9B3E-41C86DFFA30D}" type="datetimeFigureOut">
               <a:rPr lang="en-US" smtClean="0"/>
-              <a:t>19-Nov-15</a:t>
+              <a:t>11/19/2015</a:t>
             </a:fld>
             <a:endParaRPr lang="en-US"/>
           </a:p>
@@ -1862,7 +1862,7 @@
           <a:p>
             <a:fld id="{162F1D00-BD13-4404-86B0-79703945A0A7}" type="slidenum">
               <a:rPr lang="en-US" smtClean="0"/>
-              <a:t>‹#›</a:t>
+              <a:t>‹nº›</a:t>
             </a:fld>
             <a:endParaRPr lang="en-US"/>
           </a:p>
@@ -2158,7 +2158,7 @@
           <a:p>
             <a:fld id="{D728701E-CAF4-4159-9B3E-41C86DFFA30D}" type="datetimeFigureOut">
               <a:rPr lang="en-US" smtClean="0"/>
-              <a:t>19-Nov-15</a:t>
+              <a:t>11/19/2015</a:t>
             </a:fld>
             <a:endParaRPr lang="en-US"/>
           </a:p>
@@ -2484,7 +2484,7 @@
           <a:p>
             <a:fld id="{D728701E-CAF4-4159-9B3E-41C86DFFA30D}" type="datetimeFigureOut">
               <a:rPr lang="en-US" smtClean="0"/>
-              <a:t>19-Nov-15</a:t>
+              <a:t>11/19/2015</a:t>
             </a:fld>
             <a:endParaRPr lang="en-US"/>
           </a:p>
@@ -2531,7 +2531,7 @@
           <a:p>
             <a:fld id="{162F1D00-BD13-4404-86B0-79703945A0A7}" type="slidenum">
               <a:rPr lang="en-US" smtClean="0"/>
-              <a:t>‹#›</a:t>
+              <a:t>‹nº›</a:t>
             </a:fld>
             <a:endParaRPr lang="en-US"/>
           </a:p>
@@ -2782,7 +2782,7 @@
           <a:p>
             <a:fld id="{D728701E-CAF4-4159-9B3E-41C86DFFA30D}" type="datetimeFigureOut">
               <a:rPr lang="en-US" smtClean="0"/>
-              <a:t>19-Nov-15</a:t>
+              <a:t>11/19/2015</a:t>
             </a:fld>
             <a:endParaRPr lang="en-US"/>
           </a:p>
@@ -2824,7 +2824,7 @@
           <a:p>
             <a:fld id="{162F1D00-BD13-4404-86B0-79703945A0A7}" type="slidenum">
               <a:rPr lang="en-US" smtClean="0"/>
-              <a:t>‹#›</a:t>
+              <a:t>‹nº›</a:t>
             </a:fld>
             <a:endParaRPr lang="en-US"/>
           </a:p>
@@ -3169,7 +3169,7 @@
           <a:p>
             <a:fld id="{D728701E-CAF4-4159-9B3E-41C86DFFA30D}" type="datetimeFigureOut">
               <a:rPr lang="en-US" smtClean="0"/>
-              <a:t>19-Nov-15</a:t>
+              <a:t>11/19/2015</a:t>
             </a:fld>
             <a:endParaRPr lang="en-US"/>
           </a:p>
@@ -3224,7 +3224,7 @@
           <a:p>
             <a:fld id="{162F1D00-BD13-4404-86B0-79703945A0A7}" type="slidenum">
               <a:rPr lang="en-US" smtClean="0"/>
-              <a:t>‹#›</a:t>
+              <a:t>‹nº›</a:t>
             </a:fld>
             <a:endParaRPr lang="en-US"/>
           </a:p>
@@ -3589,7 +3589,7 @@
           <a:p>
             <a:fld id="{D728701E-CAF4-4159-9B3E-41C86DFFA30D}" type="datetimeFigureOut">
               <a:rPr lang="en-US" smtClean="0"/>
-              <a:t>19-Nov-15</a:t>
+              <a:t>11/19/2015</a:t>
             </a:fld>
             <a:endParaRPr lang="en-US"/>
           </a:p>
@@ -3644,7 +3644,7 @@
           <a:p>
             <a:fld id="{162F1D00-BD13-4404-86B0-79703945A0A7}" type="slidenum">
               <a:rPr lang="en-US" smtClean="0"/>
-              <a:t>‹#›</a:t>
+              <a:t>‹nº›</a:t>
             </a:fld>
             <a:endParaRPr lang="en-US"/>
           </a:p>
@@ -4137,7 +4137,7 @@
           <a:p>
             <a:fld id="{D728701E-CAF4-4159-9B3E-41C86DFFA30D}" type="datetimeFigureOut">
               <a:rPr lang="en-US" smtClean="0"/>
-              <a:t>19-Nov-15</a:t>
+              <a:t>11/19/2015</a:t>
             </a:fld>
             <a:endParaRPr lang="en-US"/>
           </a:p>
@@ -4184,7 +4184,7 @@
           <a:p>
             <a:fld id="{162F1D00-BD13-4404-86B0-79703945A0A7}" type="slidenum">
               <a:rPr lang="en-US" smtClean="0"/>
-              <a:t>‹#›</a:t>
+              <a:t>‹nº›</a:t>
             </a:fld>
             <a:endParaRPr lang="en-US"/>
           </a:p>
@@ -4495,7 +4495,7 @@
           <a:p>
             <a:fld id="{D728701E-CAF4-4159-9B3E-41C86DFFA30D}" type="datetimeFigureOut">
               <a:rPr lang="en-US" smtClean="0"/>
-              <a:t>19-Nov-15</a:t>
+              <a:t>11/19/2015</a:t>
             </a:fld>
             <a:endParaRPr lang="en-US"/>
           </a:p>
@@ -4537,7 +4537,7 @@
           <a:p>
             <a:fld id="{162F1D00-BD13-4404-86B0-79703945A0A7}" type="slidenum">
               <a:rPr lang="en-US" smtClean="0"/>
-              <a:t>‹#›</a:t>
+              <a:t>‹nº›</a:t>
             </a:fld>
             <a:endParaRPr lang="en-US"/>
           </a:p>
@@ -4710,7 +4710,7 @@
           <a:p>
             <a:fld id="{D728701E-CAF4-4159-9B3E-41C86DFFA30D}" type="datetimeFigureOut">
               <a:rPr lang="en-US" smtClean="0"/>
-              <a:t>19-Nov-15</a:t>
+              <a:t>11/19/2015</a:t>
             </a:fld>
             <a:endParaRPr lang="en-US"/>
           </a:p>
@@ -4752,7 +4752,7 @@
           <a:p>
             <a:fld id="{162F1D00-BD13-4404-86B0-79703945A0A7}" type="slidenum">
               <a:rPr lang="en-US" smtClean="0"/>
-              <a:t>‹#›</a:t>
+              <a:t>‹nº›</a:t>
             </a:fld>
             <a:endParaRPr lang="en-US"/>
           </a:p>
@@ -5017,7 +5017,7 @@
           <a:p>
             <a:fld id="{D728701E-CAF4-4159-9B3E-41C86DFFA30D}" type="datetimeFigureOut">
               <a:rPr lang="en-US" smtClean="0"/>
-              <a:t>19-Nov-15</a:t>
+              <a:t>11/19/2015</a:t>
             </a:fld>
             <a:endParaRPr lang="en-US"/>
           </a:p>
@@ -5059,7 +5059,7 @@
           <a:p>
             <a:fld id="{162F1D00-BD13-4404-86B0-79703945A0A7}" type="slidenum">
               <a:rPr lang="en-US" smtClean="0"/>
-              <a:t>‹#›</a:t>
+              <a:t>‹nº›</a:t>
             </a:fld>
             <a:endParaRPr lang="en-US"/>
           </a:p>
@@ -5273,7 +5273,7 @@
           <a:p>
             <a:fld id="{D728701E-CAF4-4159-9B3E-41C86DFFA30D}" type="datetimeFigureOut">
               <a:rPr lang="en-US" smtClean="0"/>
-              <a:t>19-Nov-15</a:t>
+              <a:t>11/19/2015</a:t>
             </a:fld>
             <a:endParaRPr lang="en-US"/>
           </a:p>
@@ -5315,7 +5315,7 @@
           <a:p>
             <a:fld id="{162F1D00-BD13-4404-86B0-79703945A0A7}" type="slidenum">
               <a:rPr lang="en-US" smtClean="0"/>
-              <a:t>‹#›</a:t>
+              <a:t>‹nº›</a:t>
             </a:fld>
             <a:endParaRPr lang="en-US"/>
           </a:p>
@@ -5662,7 +5662,7 @@
           <a:p>
             <a:fld id="{D728701E-CAF4-4159-9B3E-41C86DFFA30D}" type="datetimeFigureOut">
               <a:rPr lang="en-US" smtClean="0"/>
-              <a:t>19-Nov-15</a:t>
+              <a:t>11/19/2015</a:t>
             </a:fld>
             <a:endParaRPr lang="en-US"/>
           </a:p>
@@ -6251,7 +6251,7 @@
           <a:p>
             <a:fld id="{D728701E-CAF4-4159-9B3E-41C86DFFA30D}" type="datetimeFigureOut">
               <a:rPr lang="en-US" smtClean="0"/>
-              <a:t>19-Nov-15</a:t>
+              <a:t>11/19/2015</a:t>
             </a:fld>
             <a:endParaRPr lang="en-US"/>
           </a:p>
@@ -6311,7 +6311,7 @@
           <a:p>
             <a:fld id="{162F1D00-BD13-4404-86B0-79703945A0A7}" type="slidenum">
               <a:rPr lang="en-US" smtClean="0"/>
-              <a:t>‹#›</a:t>
+              <a:t>‹nº›</a:t>
             </a:fld>
             <a:endParaRPr lang="en-US"/>
           </a:p>
@@ -6766,7 +6766,7 @@
           <a:p>
             <a:fld id="{D728701E-CAF4-4159-9B3E-41C86DFFA30D}" type="datetimeFigureOut">
               <a:rPr lang="en-US" smtClean="0"/>
-              <a:t>19-Nov-15</a:t>
+              <a:t>11/19/2015</a:t>
             </a:fld>
             <a:endParaRPr lang="en-US"/>
           </a:p>
@@ -6808,7 +6808,7 @@
           <a:p>
             <a:fld id="{162F1D00-BD13-4404-86B0-79703945A0A7}" type="slidenum">
               <a:rPr lang="en-US" smtClean="0"/>
-              <a:t>‹#›</a:t>
+              <a:t>‹nº›</a:t>
             </a:fld>
             <a:endParaRPr lang="en-US"/>
           </a:p>
@@ -7139,7 +7139,7 @@
           <a:p>
             <a:fld id="{D728701E-CAF4-4159-9B3E-41C86DFFA30D}" type="datetimeFigureOut">
               <a:rPr lang="en-US" smtClean="0"/>
-              <a:t>19-Nov-15</a:t>
+              <a:t>11/19/2015</a:t>
             </a:fld>
             <a:endParaRPr lang="en-US"/>
           </a:p>
@@ -7181,7 +7181,7 @@
           <a:p>
             <a:fld id="{162F1D00-BD13-4404-86B0-79703945A0A7}" type="slidenum">
               <a:rPr lang="en-US" smtClean="0"/>
-              <a:t>‹#›</a:t>
+              <a:t>‹nº›</a:t>
             </a:fld>
             <a:endParaRPr lang="en-US"/>
           </a:p>
@@ -7538,7 +7538,7 @@
           <a:p>
             <a:fld id="{D728701E-CAF4-4159-9B3E-41C86DFFA30D}" type="datetimeFigureOut">
               <a:rPr lang="en-US" smtClean="0"/>
-              <a:t>19-Nov-15</a:t>
+              <a:t>11/19/2015</a:t>
             </a:fld>
             <a:endParaRPr lang="en-US"/>
           </a:p>
@@ -7718,7 +7718,7 @@
           <a:p>
             <a:fld id="{162F1D00-BD13-4404-86B0-79703945A0A7}" type="slidenum">
               <a:rPr lang="en-US" smtClean="0"/>
-              <a:t>‹#›</a:t>
+              <a:t>‹nº›</a:t>
             </a:fld>
             <a:endParaRPr lang="en-US"/>
           </a:p>
@@ -7958,7 +7958,7 @@
           <a:p>
             <a:fld id="{D728701E-CAF4-4159-9B3E-41C86DFFA30D}" type="datetimeFigureOut">
               <a:rPr lang="en-US" smtClean="0"/>
-              <a:t>19-Nov-15</a:t>
+              <a:t>11/19/2015</a:t>
             </a:fld>
             <a:endParaRPr lang="en-US"/>
           </a:p>
@@ -8000,7 +8000,7 @@
           <a:p>
             <a:fld id="{162F1D00-BD13-4404-86B0-79703945A0A7}" type="slidenum">
               <a:rPr lang="en-US" smtClean="0"/>
-              <a:t>‹#›</a:t>
+              <a:t>‹nº›</a:t>
             </a:fld>
             <a:endParaRPr lang="en-US"/>
           </a:p>
@@ -8341,7 +8341,7 @@
           <a:p>
             <a:fld id="{D728701E-CAF4-4159-9B3E-41C86DFFA30D}" type="datetimeFigureOut">
               <a:rPr lang="en-US" smtClean="0"/>
-              <a:t>19-Nov-15</a:t>
+              <a:t>11/19/2015</a:t>
             </a:fld>
             <a:endParaRPr lang="en-US"/>
           </a:p>
@@ -8418,7 +8418,7 @@
           <a:p>
             <a:fld id="{162F1D00-BD13-4404-86B0-79703945A0A7}" type="slidenum">
               <a:rPr lang="en-US" smtClean="0"/>
-              <a:t>‹#›</a:t>
+              <a:t>‹nº›</a:t>
             </a:fld>
             <a:endParaRPr lang="en-US"/>
           </a:p>
@@ -8824,7 +8824,6 @@
               <a:rPr lang="pt-PT" sz="4000" dirty="0"/>
               <a:t>8</a:t>
             </a:r>
-            <a:endParaRPr lang="pt-PT" sz="4000" dirty="0"/>
           </a:p>
         </p:txBody>
       </p:sp>
@@ -9331,33 +9330,364 @@
       </p:sp>
       <p:sp>
         <p:nvSpPr>
-          <p:cNvPr id="9" name="Marcador de Posição de Conteúdo 2"/>
-          <p:cNvSpPr>
-            <a:spLocks noGrp="1"/>
-          </p:cNvSpPr>
-          <p:nvPr>
-            <p:ph idx="1"/>
-          </p:nvPr>
-        </p:nvSpPr>
-        <p:spPr>
-          <a:xfrm>
-            <a:off x="498473" y="2129118"/>
-            <a:ext cx="8348992" cy="4324597"/>
-          </a:xfrm>
-        </p:spPr>
-        <p:txBody>
-          <a:bodyPr>
-            <a:noAutofit/>
+          <p:cNvPr id="6" name="Marcador de Posição de Conteúdo 2"/>
+          <p:cNvSpPr txBox="1">
+            <a:spLocks/>
+          </p:cNvSpPr>
+          <p:nvPr/>
+        </p:nvSpPr>
+        <p:spPr>
+          <a:xfrm>
+            <a:off x="377893" y="1970019"/>
+            <a:ext cx="8348992" cy="4501119"/>
+          </a:xfrm>
+          <a:prstGeom prst="rect">
+            <a:avLst/>
+          </a:prstGeom>
+        </p:spPr>
+        <p:txBody>
+          <a:bodyPr vert="horz" lIns="91440" tIns="45720" rIns="91440" bIns="45720" rtlCol="0">
+            <a:normAutofit fontScale="77500" lnSpcReduction="20000"/>
           </a:bodyPr>
-          <a:lstStyle/>
-          <a:p>
-            <a:r>
-              <a:rPr lang="pt-PT" sz="2400" b="1" smtClean="0"/>
-              <a:t>Atributo </a:t>
-            </a:r>
-            <a:r>
-              <a:rPr lang="pt-PT" sz="2400" smtClean="0"/>
-              <a:t>– </a:t>
+          <a:lstStyle>
+            <a:lvl1pPr marL="228600" indent="-228600" algn="l" defTabSz="914400" rtl="0" eaLnBrk="1" latinLnBrk="0" hangingPunct="1">
+              <a:spcBef>
+                <a:spcPts val="2000"/>
+              </a:spcBef>
+              <a:buClr>
+                <a:schemeClr val="accent1"/>
+              </a:buClr>
+              <a:buSzPct val="75000"/>
+              <a:buFont typeface="Wingdings" pitchFamily="2" charset="2"/>
+              <a:buChar char="n"/>
+              <a:defRPr sz="2000" kern="1200">
+                <a:solidFill>
+                  <a:schemeClr val="tx1">
+                    <a:lumMod val="65000"/>
+                    <a:lumOff val="35000"/>
+                  </a:schemeClr>
+                </a:solidFill>
+                <a:latin typeface="+mn-lt"/>
+                <a:ea typeface="+mn-ea"/>
+                <a:cs typeface="+mn-cs"/>
+              </a:defRPr>
+            </a:lvl1pPr>
+            <a:lvl2pPr marL="457200" indent="-228600" algn="l" defTabSz="914400" rtl="0" eaLnBrk="1" latinLnBrk="0" hangingPunct="1">
+              <a:spcBef>
+                <a:spcPts val="600"/>
+              </a:spcBef>
+              <a:buClr>
+                <a:schemeClr val="accent1">
+                  <a:lumMod val="60000"/>
+                  <a:lumOff val="40000"/>
+                </a:schemeClr>
+              </a:buClr>
+              <a:buSzPct val="75000"/>
+              <a:buFont typeface="Wingdings" pitchFamily="2" charset="2"/>
+              <a:buChar char="n"/>
+              <a:defRPr sz="1800" kern="1200">
+                <a:solidFill>
+                  <a:schemeClr val="tx1">
+                    <a:lumMod val="65000"/>
+                    <a:lumOff val="35000"/>
+                  </a:schemeClr>
+                </a:solidFill>
+                <a:latin typeface="+mn-lt"/>
+                <a:ea typeface="+mn-ea"/>
+                <a:cs typeface="+mn-cs"/>
+              </a:defRPr>
+            </a:lvl2pPr>
+            <a:lvl3pPr marL="685800" indent="-228600" algn="l" defTabSz="914400" rtl="0" eaLnBrk="1" latinLnBrk="0" hangingPunct="1">
+              <a:spcBef>
+                <a:spcPts val="600"/>
+              </a:spcBef>
+              <a:buClr>
+                <a:schemeClr val="accent1"/>
+              </a:buClr>
+              <a:buSzPct val="75000"/>
+              <a:buFont typeface="Wingdings" pitchFamily="2" charset="2"/>
+              <a:buChar char="n"/>
+              <a:defRPr sz="1800" kern="1200">
+                <a:solidFill>
+                  <a:schemeClr val="tx1">
+                    <a:lumMod val="65000"/>
+                    <a:lumOff val="35000"/>
+                  </a:schemeClr>
+                </a:solidFill>
+                <a:latin typeface="+mn-lt"/>
+                <a:ea typeface="+mn-ea"/>
+                <a:cs typeface="+mn-cs"/>
+              </a:defRPr>
+            </a:lvl3pPr>
+            <a:lvl4pPr marL="914400" indent="-228600" algn="l" defTabSz="914400" rtl="0" eaLnBrk="1" latinLnBrk="0" hangingPunct="1">
+              <a:spcBef>
+                <a:spcPts val="600"/>
+              </a:spcBef>
+              <a:buClr>
+                <a:schemeClr val="accent1">
+                  <a:lumMod val="60000"/>
+                  <a:lumOff val="40000"/>
+                </a:schemeClr>
+              </a:buClr>
+              <a:buSzPct val="75000"/>
+              <a:buFont typeface="Wingdings" pitchFamily="2" charset="2"/>
+              <a:buChar char="n"/>
+              <a:defRPr sz="1800" kern="1200">
+                <a:solidFill>
+                  <a:schemeClr val="tx1">
+                    <a:lumMod val="65000"/>
+                    <a:lumOff val="35000"/>
+                  </a:schemeClr>
+                </a:solidFill>
+                <a:latin typeface="+mn-lt"/>
+                <a:ea typeface="+mn-ea"/>
+                <a:cs typeface="+mn-cs"/>
+              </a:defRPr>
+            </a:lvl4pPr>
+            <a:lvl5pPr marL="1143000" indent="-228600" algn="l" defTabSz="914400" rtl="0" eaLnBrk="1" latinLnBrk="0" hangingPunct="1">
+              <a:spcBef>
+                <a:spcPts val="600"/>
+              </a:spcBef>
+              <a:buClr>
+                <a:schemeClr val="accent1"/>
+              </a:buClr>
+              <a:buSzPct val="75000"/>
+              <a:buFont typeface="Wingdings" pitchFamily="2" charset="2"/>
+              <a:buChar char="n"/>
+              <a:defRPr sz="1800" kern="1200">
+                <a:solidFill>
+                  <a:schemeClr val="tx1">
+                    <a:lumMod val="65000"/>
+                    <a:lumOff val="35000"/>
+                  </a:schemeClr>
+                </a:solidFill>
+                <a:latin typeface="+mn-lt"/>
+                <a:ea typeface="+mn-ea"/>
+                <a:cs typeface="+mn-cs"/>
+              </a:defRPr>
+            </a:lvl5pPr>
+            <a:lvl6pPr marL="1377950" indent="-228600" algn="l" defTabSz="914400" rtl="0" eaLnBrk="1" latinLnBrk="0" hangingPunct="1">
+              <a:spcBef>
+                <a:spcPct val="20000"/>
+              </a:spcBef>
+              <a:buClr>
+                <a:schemeClr val="accent1">
+                  <a:lumMod val="60000"/>
+                  <a:lumOff val="40000"/>
+                </a:schemeClr>
+              </a:buClr>
+              <a:buSzPct val="75000"/>
+              <a:buFont typeface="Wingdings" pitchFamily="2" charset="2"/>
+              <a:buChar char=""/>
+              <a:defRPr lang="en-US" sz="1800" kern="1200" dirty="0" smtClean="0">
+                <a:solidFill>
+                  <a:schemeClr val="tx1">
+                    <a:lumMod val="65000"/>
+                    <a:lumOff val="35000"/>
+                  </a:schemeClr>
+                </a:solidFill>
+                <a:latin typeface="+mn-lt"/>
+                <a:ea typeface="+mn-ea"/>
+                <a:cs typeface="+mn-cs"/>
+              </a:defRPr>
+            </a:lvl6pPr>
+            <a:lvl7pPr marL="1603375" indent="-228600" algn="l" defTabSz="914400" rtl="0" eaLnBrk="1" latinLnBrk="0" hangingPunct="1">
+              <a:spcBef>
+                <a:spcPct val="20000"/>
+              </a:spcBef>
+              <a:buClr>
+                <a:schemeClr val="accent1"/>
+              </a:buClr>
+              <a:buSzPct val="75000"/>
+              <a:buFont typeface="Wingdings" pitchFamily="2" charset="2"/>
+              <a:buChar char=""/>
+              <a:defRPr lang="en-US" sz="1800" kern="1200" baseline="0" dirty="0" smtClean="0">
+                <a:solidFill>
+                  <a:schemeClr val="tx1">
+                    <a:lumMod val="65000"/>
+                    <a:lumOff val="35000"/>
+                  </a:schemeClr>
+                </a:solidFill>
+                <a:latin typeface="+mn-lt"/>
+                <a:ea typeface="+mn-ea"/>
+                <a:cs typeface="+mn-cs"/>
+              </a:defRPr>
+            </a:lvl7pPr>
+            <a:lvl8pPr marL="1830388" indent="-228600" algn="l" defTabSz="914400" rtl="0" eaLnBrk="1" latinLnBrk="0" hangingPunct="1">
+              <a:spcBef>
+                <a:spcPct val="20000"/>
+              </a:spcBef>
+              <a:buClr>
+                <a:schemeClr val="accent1">
+                  <a:lumMod val="60000"/>
+                  <a:lumOff val="40000"/>
+                </a:schemeClr>
+              </a:buClr>
+              <a:buSzPct val="75000"/>
+              <a:buFont typeface="Wingdings" pitchFamily="2" charset="2"/>
+              <a:buChar char=""/>
+              <a:defRPr lang="en-US" sz="1800" kern="1200" baseline="0" dirty="0" smtClean="0">
+                <a:solidFill>
+                  <a:schemeClr val="tx1">
+                    <a:lumMod val="65000"/>
+                    <a:lumOff val="35000"/>
+                  </a:schemeClr>
+                </a:solidFill>
+                <a:latin typeface="+mn-lt"/>
+                <a:ea typeface="+mn-ea"/>
+                <a:cs typeface="+mn-cs"/>
+              </a:defRPr>
+            </a:lvl8pPr>
+            <a:lvl9pPr marL="2057400" indent="-228600" algn="l" defTabSz="914400" rtl="0" eaLnBrk="1" latinLnBrk="0" hangingPunct="1">
+              <a:spcBef>
+                <a:spcPct val="20000"/>
+              </a:spcBef>
+              <a:buClr>
+                <a:schemeClr val="accent1"/>
+              </a:buClr>
+              <a:buSzPct val="75000"/>
+              <a:buFont typeface="Wingdings" pitchFamily="2" charset="2"/>
+              <a:buChar char=""/>
+              <a:defRPr lang="en-US" sz="1800" kern="1200" baseline="0" dirty="0">
+                <a:solidFill>
+                  <a:schemeClr val="tx1">
+                    <a:lumMod val="65000"/>
+                    <a:lumOff val="35000"/>
+                  </a:schemeClr>
+                </a:solidFill>
+                <a:latin typeface="+mn-lt"/>
+                <a:ea typeface="+mn-ea"/>
+                <a:cs typeface="+mn-cs"/>
+              </a:defRPr>
+            </a:lvl9pPr>
+          </a:lstStyle>
+          <a:p>
+            <a:r>
+              <a:rPr lang="pt-PT" b="1" dirty="0" smtClean="0"/>
+              <a:t>Atributo:</a:t>
+            </a:r>
+            <a:r>
+              <a:rPr lang="pt-PT" dirty="0" smtClean="0"/>
+              <a:t> Facilidade em criar um curso.</a:t>
+            </a:r>
+            <a:endParaRPr lang="en-US" dirty="0" smtClean="0"/>
+          </a:p>
+          <a:p>
+            <a:r>
+              <a:rPr lang="pt-PT" b="1" dirty="0" smtClean="0"/>
+              <a:t>Medida 1:</a:t>
+            </a:r>
+            <a:r>
+              <a:rPr lang="pt-PT" dirty="0" smtClean="0"/>
+              <a:t> nº de erros cometidos.</a:t>
+            </a:r>
+            <a:endParaRPr lang="en-US" dirty="0" smtClean="0"/>
+          </a:p>
+          <a:p>
+            <a:r>
+              <a:rPr lang="pt-PT" b="1" dirty="0" smtClean="0"/>
+              <a:t>Medida 2: </a:t>
+            </a:r>
+            <a:r>
+              <a:rPr lang="pt-PT" dirty="0" smtClean="0"/>
+              <a:t>tempo que demora a identificar e </a:t>
+            </a:r>
+            <a:r>
+              <a:rPr lang="pt-PT" dirty="0" err="1" smtClean="0"/>
+              <a:t>selecionar</a:t>
+            </a:r>
+            <a:r>
+              <a:rPr lang="pt-PT" dirty="0" smtClean="0"/>
+              <a:t> o botão “Criar Curso” e preencher os dados sobre o novo curso.</a:t>
+            </a:r>
+          </a:p>
+          <a:p>
+            <a:r>
+              <a:rPr lang="pt-PT" b="1" dirty="0"/>
+              <a:t>Medida 3</a:t>
+            </a:r>
+            <a:r>
+              <a:rPr lang="pt-PT" b="1" dirty="0" smtClean="0"/>
+              <a:t>: </a:t>
+            </a:r>
+            <a:r>
+              <a:rPr lang="pt-PT" dirty="0" smtClean="0"/>
+              <a:t>nº de cliques feitos até concluir tarefa.</a:t>
+            </a:r>
+            <a:endParaRPr lang="en-US" dirty="0" smtClean="0"/>
+          </a:p>
+          <a:p>
+            <a:r>
+              <a:rPr lang="pt-PT" b="1" dirty="0" smtClean="0"/>
+              <a:t>Método da Medição: </a:t>
+            </a:r>
+            <a:r>
+              <a:rPr lang="pt-PT" dirty="0"/>
+              <a:t>Criar um curso dedicado ao campo de Agricultura. Devem de ser dadas informações quanto ao número de aulas, custo do </a:t>
+            </a:r>
+            <a:r>
+              <a:rPr lang="pt-PT" dirty="0" smtClean="0"/>
+              <a:t>curso, informação sobre o curso </a:t>
+            </a:r>
+            <a:r>
+              <a:rPr lang="pt-PT" dirty="0"/>
+              <a:t>e informações acerca do professor (Email e Telefone).</a:t>
+            </a:r>
+            <a:endParaRPr lang="en-US" dirty="0" smtClean="0"/>
+          </a:p>
+          <a:p>
+            <a:r>
+              <a:rPr lang="pt-PT" b="1" dirty="0" err="1" smtClean="0"/>
+              <a:t>Current</a:t>
+            </a:r>
+            <a:r>
+              <a:rPr lang="pt-PT" b="1" dirty="0" smtClean="0"/>
+              <a:t>:</a:t>
+            </a:r>
+            <a:r>
+              <a:rPr lang="pt-PT" dirty="0" smtClean="0"/>
+              <a:t> 0 erros (Medida 1); 2 minutos (Medida 2); 7 cliques (Medida 3).</a:t>
+            </a:r>
+            <a:endParaRPr lang="en-US" dirty="0" smtClean="0"/>
+          </a:p>
+          <a:p>
+            <a:r>
+              <a:rPr lang="pt-PT" b="1" dirty="0" err="1" smtClean="0"/>
+              <a:t>Minumum</a:t>
+            </a:r>
+            <a:r>
+              <a:rPr lang="pt-PT" b="1" dirty="0" smtClean="0"/>
+              <a:t>:</a:t>
+            </a:r>
+            <a:r>
+              <a:rPr lang="pt-PT" dirty="0" smtClean="0"/>
+              <a:t> 1 erro (Medida 1); 3 minutos (Medida 2); 12 cliques (Medida 3).</a:t>
+            </a:r>
+            <a:endParaRPr lang="en-US" dirty="0" smtClean="0"/>
+          </a:p>
+          <a:p>
+            <a:r>
+              <a:rPr lang="pt-PT" b="1" dirty="0" smtClean="0"/>
+              <a:t>Target:</a:t>
+            </a:r>
+            <a:r>
+              <a:rPr lang="pt-PT" dirty="0" smtClean="0"/>
+              <a:t> 0 erros (Medida 1); 2 minutos (Medida 2); 7 cliques (Medida 3).</a:t>
+            </a:r>
+            <a:endParaRPr lang="en-US" dirty="0" smtClean="0"/>
+          </a:p>
+          <a:p>
+            <a:r>
+              <a:rPr lang="pt-PT" b="1" dirty="0" err="1" smtClean="0"/>
+              <a:t>Optimal</a:t>
+            </a:r>
+            <a:r>
+              <a:rPr lang="pt-PT" b="1" dirty="0" smtClean="0"/>
+              <a:t>:</a:t>
+            </a:r>
+            <a:r>
+              <a:rPr lang="pt-PT" dirty="0" smtClean="0"/>
+              <a:t> 0 erros (Medida 1); 1 minuto (Medida 2); 7 cliques (Medida 3). </a:t>
             </a:r>
             <a:endParaRPr lang="en-US" sz="2400" dirty="0"/>
           </a:p>
@@ -9684,29 +10014,372 @@
       </p:sp>
       <p:sp>
         <p:nvSpPr>
-          <p:cNvPr id="9" name="Marcador de Posição de Conteúdo 2"/>
-          <p:cNvSpPr>
-            <a:spLocks noGrp="1"/>
-          </p:cNvSpPr>
-          <p:nvPr>
-            <p:ph idx="1"/>
-          </p:nvPr>
-        </p:nvSpPr>
-        <p:spPr>
-          <a:xfrm>
-            <a:off x="498473" y="2129118"/>
-            <a:ext cx="8348992" cy="4324597"/>
-          </a:xfrm>
-        </p:spPr>
-        <p:txBody>
-          <a:bodyPr>
-            <a:noAutofit/>
+          <p:cNvPr id="6" name="Marcador de Posição de Conteúdo 2"/>
+          <p:cNvSpPr txBox="1">
+            <a:spLocks/>
+          </p:cNvSpPr>
+          <p:nvPr/>
+        </p:nvSpPr>
+        <p:spPr>
+          <a:xfrm>
+            <a:off x="377893" y="1970019"/>
+            <a:ext cx="8348992" cy="4752328"/>
+          </a:xfrm>
+          <a:prstGeom prst="rect">
+            <a:avLst/>
+          </a:prstGeom>
+        </p:spPr>
+        <p:txBody>
+          <a:bodyPr vert="horz" lIns="91440" tIns="45720" rIns="91440" bIns="45720" rtlCol="0">
+            <a:normAutofit fontScale="77500" lnSpcReduction="20000"/>
           </a:bodyPr>
-          <a:lstStyle/>
-          <a:p>
-            <a:r>
-              <a:rPr lang="pt-PT" sz="2400" dirty="0" smtClean="0"/>
-              <a:t>Atributo – </a:t>
+          <a:lstStyle>
+            <a:lvl1pPr marL="228600" indent="-228600" algn="l" defTabSz="914400" rtl="0" eaLnBrk="1" latinLnBrk="0" hangingPunct="1">
+              <a:spcBef>
+                <a:spcPts val="2000"/>
+              </a:spcBef>
+              <a:buClr>
+                <a:schemeClr val="accent1"/>
+              </a:buClr>
+              <a:buSzPct val="75000"/>
+              <a:buFont typeface="Wingdings" pitchFamily="2" charset="2"/>
+              <a:buChar char="n"/>
+              <a:defRPr sz="2000" kern="1200">
+                <a:solidFill>
+                  <a:schemeClr val="tx1">
+                    <a:lumMod val="65000"/>
+                    <a:lumOff val="35000"/>
+                  </a:schemeClr>
+                </a:solidFill>
+                <a:latin typeface="+mn-lt"/>
+                <a:ea typeface="+mn-ea"/>
+                <a:cs typeface="+mn-cs"/>
+              </a:defRPr>
+            </a:lvl1pPr>
+            <a:lvl2pPr marL="457200" indent="-228600" algn="l" defTabSz="914400" rtl="0" eaLnBrk="1" latinLnBrk="0" hangingPunct="1">
+              <a:spcBef>
+                <a:spcPts val="600"/>
+              </a:spcBef>
+              <a:buClr>
+                <a:schemeClr val="accent1">
+                  <a:lumMod val="60000"/>
+                  <a:lumOff val="40000"/>
+                </a:schemeClr>
+              </a:buClr>
+              <a:buSzPct val="75000"/>
+              <a:buFont typeface="Wingdings" pitchFamily="2" charset="2"/>
+              <a:buChar char="n"/>
+              <a:defRPr sz="1800" kern="1200">
+                <a:solidFill>
+                  <a:schemeClr val="tx1">
+                    <a:lumMod val="65000"/>
+                    <a:lumOff val="35000"/>
+                  </a:schemeClr>
+                </a:solidFill>
+                <a:latin typeface="+mn-lt"/>
+                <a:ea typeface="+mn-ea"/>
+                <a:cs typeface="+mn-cs"/>
+              </a:defRPr>
+            </a:lvl2pPr>
+            <a:lvl3pPr marL="685800" indent="-228600" algn="l" defTabSz="914400" rtl="0" eaLnBrk="1" latinLnBrk="0" hangingPunct="1">
+              <a:spcBef>
+                <a:spcPts val="600"/>
+              </a:spcBef>
+              <a:buClr>
+                <a:schemeClr val="accent1"/>
+              </a:buClr>
+              <a:buSzPct val="75000"/>
+              <a:buFont typeface="Wingdings" pitchFamily="2" charset="2"/>
+              <a:buChar char="n"/>
+              <a:defRPr sz="1800" kern="1200">
+                <a:solidFill>
+                  <a:schemeClr val="tx1">
+                    <a:lumMod val="65000"/>
+                    <a:lumOff val="35000"/>
+                  </a:schemeClr>
+                </a:solidFill>
+                <a:latin typeface="+mn-lt"/>
+                <a:ea typeface="+mn-ea"/>
+                <a:cs typeface="+mn-cs"/>
+              </a:defRPr>
+            </a:lvl3pPr>
+            <a:lvl4pPr marL="914400" indent="-228600" algn="l" defTabSz="914400" rtl="0" eaLnBrk="1" latinLnBrk="0" hangingPunct="1">
+              <a:spcBef>
+                <a:spcPts val="600"/>
+              </a:spcBef>
+              <a:buClr>
+                <a:schemeClr val="accent1">
+                  <a:lumMod val="60000"/>
+                  <a:lumOff val="40000"/>
+                </a:schemeClr>
+              </a:buClr>
+              <a:buSzPct val="75000"/>
+              <a:buFont typeface="Wingdings" pitchFamily="2" charset="2"/>
+              <a:buChar char="n"/>
+              <a:defRPr sz="1800" kern="1200">
+                <a:solidFill>
+                  <a:schemeClr val="tx1">
+                    <a:lumMod val="65000"/>
+                    <a:lumOff val="35000"/>
+                  </a:schemeClr>
+                </a:solidFill>
+                <a:latin typeface="+mn-lt"/>
+                <a:ea typeface="+mn-ea"/>
+                <a:cs typeface="+mn-cs"/>
+              </a:defRPr>
+            </a:lvl4pPr>
+            <a:lvl5pPr marL="1143000" indent="-228600" algn="l" defTabSz="914400" rtl="0" eaLnBrk="1" latinLnBrk="0" hangingPunct="1">
+              <a:spcBef>
+                <a:spcPts val="600"/>
+              </a:spcBef>
+              <a:buClr>
+                <a:schemeClr val="accent1"/>
+              </a:buClr>
+              <a:buSzPct val="75000"/>
+              <a:buFont typeface="Wingdings" pitchFamily="2" charset="2"/>
+              <a:buChar char="n"/>
+              <a:defRPr sz="1800" kern="1200">
+                <a:solidFill>
+                  <a:schemeClr val="tx1">
+                    <a:lumMod val="65000"/>
+                    <a:lumOff val="35000"/>
+                  </a:schemeClr>
+                </a:solidFill>
+                <a:latin typeface="+mn-lt"/>
+                <a:ea typeface="+mn-ea"/>
+                <a:cs typeface="+mn-cs"/>
+              </a:defRPr>
+            </a:lvl5pPr>
+            <a:lvl6pPr marL="1377950" indent="-228600" algn="l" defTabSz="914400" rtl="0" eaLnBrk="1" latinLnBrk="0" hangingPunct="1">
+              <a:spcBef>
+                <a:spcPct val="20000"/>
+              </a:spcBef>
+              <a:buClr>
+                <a:schemeClr val="accent1">
+                  <a:lumMod val="60000"/>
+                  <a:lumOff val="40000"/>
+                </a:schemeClr>
+              </a:buClr>
+              <a:buSzPct val="75000"/>
+              <a:buFont typeface="Wingdings" pitchFamily="2" charset="2"/>
+              <a:buChar char=""/>
+              <a:defRPr lang="en-US" sz="1800" kern="1200" dirty="0" smtClean="0">
+                <a:solidFill>
+                  <a:schemeClr val="tx1">
+                    <a:lumMod val="65000"/>
+                    <a:lumOff val="35000"/>
+                  </a:schemeClr>
+                </a:solidFill>
+                <a:latin typeface="+mn-lt"/>
+                <a:ea typeface="+mn-ea"/>
+                <a:cs typeface="+mn-cs"/>
+              </a:defRPr>
+            </a:lvl6pPr>
+            <a:lvl7pPr marL="1603375" indent="-228600" algn="l" defTabSz="914400" rtl="0" eaLnBrk="1" latinLnBrk="0" hangingPunct="1">
+              <a:spcBef>
+                <a:spcPct val="20000"/>
+              </a:spcBef>
+              <a:buClr>
+                <a:schemeClr val="accent1"/>
+              </a:buClr>
+              <a:buSzPct val="75000"/>
+              <a:buFont typeface="Wingdings" pitchFamily="2" charset="2"/>
+              <a:buChar char=""/>
+              <a:defRPr lang="en-US" sz="1800" kern="1200" baseline="0" dirty="0" smtClean="0">
+                <a:solidFill>
+                  <a:schemeClr val="tx1">
+                    <a:lumMod val="65000"/>
+                    <a:lumOff val="35000"/>
+                  </a:schemeClr>
+                </a:solidFill>
+                <a:latin typeface="+mn-lt"/>
+                <a:ea typeface="+mn-ea"/>
+                <a:cs typeface="+mn-cs"/>
+              </a:defRPr>
+            </a:lvl7pPr>
+            <a:lvl8pPr marL="1830388" indent="-228600" algn="l" defTabSz="914400" rtl="0" eaLnBrk="1" latinLnBrk="0" hangingPunct="1">
+              <a:spcBef>
+                <a:spcPct val="20000"/>
+              </a:spcBef>
+              <a:buClr>
+                <a:schemeClr val="accent1">
+                  <a:lumMod val="60000"/>
+                  <a:lumOff val="40000"/>
+                </a:schemeClr>
+              </a:buClr>
+              <a:buSzPct val="75000"/>
+              <a:buFont typeface="Wingdings" pitchFamily="2" charset="2"/>
+              <a:buChar char=""/>
+              <a:defRPr lang="en-US" sz="1800" kern="1200" baseline="0" dirty="0" smtClean="0">
+                <a:solidFill>
+                  <a:schemeClr val="tx1">
+                    <a:lumMod val="65000"/>
+                    <a:lumOff val="35000"/>
+                  </a:schemeClr>
+                </a:solidFill>
+                <a:latin typeface="+mn-lt"/>
+                <a:ea typeface="+mn-ea"/>
+                <a:cs typeface="+mn-cs"/>
+              </a:defRPr>
+            </a:lvl8pPr>
+            <a:lvl9pPr marL="2057400" indent="-228600" algn="l" defTabSz="914400" rtl="0" eaLnBrk="1" latinLnBrk="0" hangingPunct="1">
+              <a:spcBef>
+                <a:spcPct val="20000"/>
+              </a:spcBef>
+              <a:buClr>
+                <a:schemeClr val="accent1"/>
+              </a:buClr>
+              <a:buSzPct val="75000"/>
+              <a:buFont typeface="Wingdings" pitchFamily="2" charset="2"/>
+              <a:buChar char=""/>
+              <a:defRPr lang="en-US" sz="1800" kern="1200" baseline="0" dirty="0">
+                <a:solidFill>
+                  <a:schemeClr val="tx1">
+                    <a:lumMod val="65000"/>
+                    <a:lumOff val="35000"/>
+                  </a:schemeClr>
+                </a:solidFill>
+                <a:latin typeface="+mn-lt"/>
+                <a:ea typeface="+mn-ea"/>
+                <a:cs typeface="+mn-cs"/>
+              </a:defRPr>
+            </a:lvl9pPr>
+          </a:lstStyle>
+          <a:p>
+            <a:r>
+              <a:rPr lang="pt-PT" b="1" dirty="0" smtClean="0"/>
+              <a:t>Atributo:</a:t>
+            </a:r>
+            <a:r>
+              <a:rPr lang="pt-PT" dirty="0" smtClean="0"/>
+              <a:t> Facilidade em adicionar uma aula a um curso.</a:t>
+            </a:r>
+            <a:endParaRPr lang="en-US" dirty="0" smtClean="0"/>
+          </a:p>
+          <a:p>
+            <a:r>
+              <a:rPr lang="pt-PT" b="1" dirty="0" smtClean="0"/>
+              <a:t>Medida 1:</a:t>
+            </a:r>
+            <a:r>
+              <a:rPr lang="pt-PT" dirty="0" smtClean="0"/>
+              <a:t> nº de erros cometidos.</a:t>
+            </a:r>
+            <a:endParaRPr lang="en-US" dirty="0" smtClean="0"/>
+          </a:p>
+          <a:p>
+            <a:r>
+              <a:rPr lang="pt-PT" b="1" dirty="0" smtClean="0"/>
+              <a:t>Medida 2: </a:t>
+            </a:r>
+            <a:r>
+              <a:rPr lang="pt-PT" dirty="0" smtClean="0"/>
+              <a:t>tempo que demora a identificar e </a:t>
+            </a:r>
+            <a:r>
+              <a:rPr lang="pt-PT" dirty="0" err="1" smtClean="0"/>
+              <a:t>selecionar</a:t>
+            </a:r>
+            <a:r>
+              <a:rPr lang="pt-PT" dirty="0" smtClean="0"/>
+              <a:t> a secção “Meus </a:t>
+            </a:r>
+            <a:r>
+              <a:rPr lang="pt-PT" dirty="0" err="1" smtClean="0"/>
+              <a:t>cursos”,”Curso</a:t>
+            </a:r>
+            <a:r>
+              <a:rPr lang="pt-PT" dirty="0" smtClean="0"/>
+              <a:t> de Agricultura”, “Adicionar Aula” e preencher os dados sobre a nova aula.</a:t>
+            </a:r>
+          </a:p>
+          <a:p>
+            <a:r>
+              <a:rPr lang="pt-PT" b="1" dirty="0"/>
+              <a:t>Medida 3</a:t>
+            </a:r>
+            <a:r>
+              <a:rPr lang="pt-PT" b="1" dirty="0" smtClean="0"/>
+              <a:t>: </a:t>
+            </a:r>
+            <a:r>
+              <a:rPr lang="pt-PT" dirty="0" smtClean="0"/>
+              <a:t>nº de cliques feitos até concluir tarefa.</a:t>
+            </a:r>
+            <a:endParaRPr lang="en-US" dirty="0" smtClean="0"/>
+          </a:p>
+          <a:p>
+            <a:r>
+              <a:rPr lang="pt-PT" b="1" dirty="0" smtClean="0"/>
+              <a:t>Método da Medição: </a:t>
+            </a:r>
+            <a:r>
+              <a:rPr lang="pt-PT" dirty="0"/>
+              <a:t>Na página dedicada ao curso (usando o exemplo anterior da agricultura), clicar no botão “Adicionar Aula”. De seguida, basta escrever um excerto sobre o conteúdo da aula, informação quanto ao tempo da mesma e fazer um </a:t>
+            </a:r>
+            <a:r>
+              <a:rPr lang="pt-PT" dirty="0" err="1"/>
+              <a:t>upload</a:t>
+            </a:r>
+            <a:r>
+              <a:rPr lang="pt-PT" dirty="0"/>
+              <a:t> da vídeo-aula gravada.</a:t>
+            </a:r>
+            <a:endParaRPr lang="en-US" dirty="0" smtClean="0"/>
+          </a:p>
+          <a:p>
+            <a:r>
+              <a:rPr lang="pt-PT" b="1" dirty="0" err="1" smtClean="0"/>
+              <a:t>Current</a:t>
+            </a:r>
+            <a:r>
+              <a:rPr lang="pt-PT" b="1" dirty="0" smtClean="0"/>
+              <a:t>:</a:t>
+            </a:r>
+            <a:r>
+              <a:rPr lang="pt-PT" dirty="0" smtClean="0"/>
+              <a:t> 1 erro (Medida 1); 3 minutos (Medida 2); 9 cliques (Medida 3).</a:t>
+            </a:r>
+            <a:endParaRPr lang="en-US" dirty="0" smtClean="0"/>
+          </a:p>
+          <a:p>
+            <a:r>
+              <a:rPr lang="pt-PT" b="1" dirty="0" err="1" smtClean="0"/>
+              <a:t>Minumum</a:t>
+            </a:r>
+            <a:r>
+              <a:rPr lang="pt-PT" b="1" dirty="0" smtClean="0"/>
+              <a:t>:</a:t>
+            </a:r>
+            <a:r>
+              <a:rPr lang="pt-PT" dirty="0" smtClean="0"/>
+              <a:t> 3 erros (Medida 1); 5 minutos (Medida 2); 13 cliques (Medida 3).</a:t>
+            </a:r>
+            <a:endParaRPr lang="en-US" dirty="0" smtClean="0"/>
+          </a:p>
+          <a:p>
+            <a:r>
+              <a:rPr lang="pt-PT" b="1" dirty="0" smtClean="0"/>
+              <a:t>Target:</a:t>
+            </a:r>
+            <a:r>
+              <a:rPr lang="pt-PT" dirty="0" smtClean="0"/>
+              <a:t> 1 erro (Medida 1); 2 minutos (Medida 2); 8 cliques (Medida 3).</a:t>
+            </a:r>
+            <a:endParaRPr lang="en-US" dirty="0" smtClean="0"/>
+          </a:p>
+          <a:p>
+            <a:r>
+              <a:rPr lang="pt-PT" b="1" dirty="0" err="1" smtClean="0"/>
+              <a:t>Optimal</a:t>
+            </a:r>
+            <a:r>
+              <a:rPr lang="pt-PT" b="1" dirty="0" smtClean="0"/>
+              <a:t>:</a:t>
+            </a:r>
+            <a:r>
+              <a:rPr lang="pt-PT" dirty="0" smtClean="0"/>
+              <a:t> 0 erros (Medida 1); 1 minuto e 30 segundos (Medida 2); 6 cliques (Medida 3). </a:t>
             </a:r>
             <a:endParaRPr lang="en-US" sz="2400" dirty="0"/>
           </a:p>
@@ -12971,7 +13644,7 @@
   <a:extraClrSchemeLst/>
   <a:extLst>
     <a:ext uri="{05A4C25C-085E-4340-85A3-A5531E510DB2}">
-      <thm15:themeFamily xmlns:thm15="http://schemas.microsoft.com/office/thememl/2012/main" xmlns="" name="Office Theme" id="{62F939B6-93AF-4DB8-9C6B-D6C7DFDC589F}" vid="{4A3C46E8-61CC-4603-A589-7422A47A8E4A}"/>
+      <thm15:themeFamily xmlns="" xmlns:thm15="http://schemas.microsoft.com/office/thememl/2012/main" name="Office Theme" id="{62F939B6-93AF-4DB8-9C6B-D6C7DFDC589F}" vid="{4A3C46E8-61CC-4603-A589-7422A47A8E4A}"/>
     </a:ext>
   </a:extLst>
 </a:theme>

</xml_diff>